<commit_message>
Low Power Consumption Slide added
</commit_message>
<xml_diff>
--- a/Seismograph_System___Assignment_3.pptx
+++ b/Seismograph_System___Assignment_3.pptx
@@ -7,10 +7,10 @@
     <p:sldMasterId id="2147484452" r:id="rId3"/>
   </p:sldMasterIdLst>
   <p:notesMasterIdLst>
-    <p:notesMasterId r:id="rId15"/>
+    <p:notesMasterId r:id="rId16"/>
   </p:notesMasterIdLst>
   <p:handoutMasterIdLst>
-    <p:handoutMasterId r:id="rId16"/>
+    <p:handoutMasterId r:id="rId17"/>
   </p:handoutMasterIdLst>
   <p:sldIdLst>
     <p:sldId id="256" r:id="rId4"/>
@@ -19,11 +19,12 @@
     <p:sldId id="565" r:id="rId7"/>
     <p:sldId id="564" r:id="rId8"/>
     <p:sldId id="559" r:id="rId9"/>
-    <p:sldId id="560" r:id="rId10"/>
-    <p:sldId id="558" r:id="rId11"/>
-    <p:sldId id="563" r:id="rId12"/>
-    <p:sldId id="561" r:id="rId13"/>
-    <p:sldId id="552" r:id="rId14"/>
+    <p:sldId id="566" r:id="rId10"/>
+    <p:sldId id="560" r:id="rId11"/>
+    <p:sldId id="558" r:id="rId12"/>
+    <p:sldId id="563" r:id="rId13"/>
+    <p:sldId id="561" r:id="rId14"/>
+    <p:sldId id="552" r:id="rId15"/>
   </p:sldIdLst>
   <p:sldSz cx="9144000" cy="6858000" type="screen4x3"/>
   <p:notesSz cx="6858000" cy="9144000"/>
@@ -8272,6 +8273,566 @@
 </file>
 
 <file path=ppt/slides/slide10.xml><?xml version="1.0" encoding="utf-8"?>
+<p:sld xmlns:a="http://schemas.openxmlformats.org/drawingml/2006/main" xmlns:r="http://schemas.openxmlformats.org/officeDocument/2006/relationships" xmlns:p="http://schemas.openxmlformats.org/presentationml/2006/main">
+  <p:cSld>
+    <p:spTree>
+      <p:nvGrpSpPr>
+        <p:cNvPr id="1" name=""/>
+        <p:cNvGrpSpPr/>
+        <p:nvPr/>
+      </p:nvGrpSpPr>
+      <p:grpSpPr>
+        <a:xfrm>
+          <a:off x="0" y="0"/>
+          <a:ext cx="0" cy="0"/>
+          <a:chOff x="0" y="0"/>
+          <a:chExt cx="0" cy="0"/>
+        </a:xfrm>
+      </p:grpSpPr>
+      <p:sp>
+        <p:nvSpPr>
+          <p:cNvPr id="2" name="Titolo 1">
+            <a:extLst>
+              <a:ext uri="{FF2B5EF4-FFF2-40B4-BE49-F238E27FC236}">
+                <a16:creationId xmlns:a16="http://schemas.microsoft.com/office/drawing/2014/main" id="{F46470BA-3007-184B-AF37-345D6F80A390}"/>
+              </a:ext>
+            </a:extLst>
+          </p:cNvPr>
+          <p:cNvSpPr>
+            <a:spLocks noGrp="1"/>
+          </p:cNvSpPr>
+          <p:nvPr>
+            <p:ph type="title"/>
+          </p:nvPr>
+        </p:nvSpPr>
+        <p:spPr/>
+        <p:txBody>
+          <a:bodyPr/>
+          <a:lstStyle/>
+          <a:p>
+            <a:r>
+              <a:rPr lang="en-US" dirty="0"/>
+              <a:t>Method: Telegram Bot</a:t>
+            </a:r>
+          </a:p>
+        </p:txBody>
+      </p:sp>
+      <p:sp>
+        <p:nvSpPr>
+          <p:cNvPr id="4" name="Segnaposto numero diapositiva 3">
+            <a:extLst>
+              <a:ext uri="{FF2B5EF4-FFF2-40B4-BE49-F238E27FC236}">
+                <a16:creationId xmlns:a16="http://schemas.microsoft.com/office/drawing/2014/main" id="{50171237-E74B-F34B-A6AD-2ADA04AB097D}"/>
+              </a:ext>
+            </a:extLst>
+          </p:cNvPr>
+          <p:cNvSpPr>
+            <a:spLocks noGrp="1"/>
+          </p:cNvSpPr>
+          <p:nvPr>
+            <p:ph type="sldNum" sz="quarter" idx="12"/>
+          </p:nvPr>
+        </p:nvSpPr>
+        <p:spPr/>
+        <p:txBody>
+          <a:bodyPr/>
+          <a:lstStyle/>
+          <a:p>
+            <a:fld id="{389832E7-CD1C-8649-98ED-2ABDE863B9F8}" type="slidenum">
+              <a:rPr lang="it-IT" smtClean="0"/>
+              <a:pPr/>
+              <a:t>10</a:t>
+            </a:fld>
+            <a:endParaRPr lang="it-IT" dirty="0" err="1"/>
+          </a:p>
+        </p:txBody>
+      </p:sp>
+      <p:sp>
+        <p:nvSpPr>
+          <p:cNvPr id="5" name="Segnaposto contenuto 4">
+            <a:extLst>
+              <a:ext uri="{FF2B5EF4-FFF2-40B4-BE49-F238E27FC236}">
+                <a16:creationId xmlns:a16="http://schemas.microsoft.com/office/drawing/2014/main" id="{5790AEF5-1816-BB41-AD38-B2380590B075}"/>
+              </a:ext>
+            </a:extLst>
+          </p:cNvPr>
+          <p:cNvSpPr>
+            <a:spLocks noGrp="1"/>
+          </p:cNvSpPr>
+          <p:nvPr>
+            <p:ph sz="quarter" idx="13"/>
+          </p:nvPr>
+        </p:nvSpPr>
+        <p:spPr/>
+        <p:txBody>
+          <a:bodyPr/>
+          <a:lstStyle/>
+          <a:p>
+            <a:r>
+              <a:rPr lang="en-US" dirty="0"/>
+              <a:t>Description system: choices, parameters, use cases</a:t>
+            </a:r>
+          </a:p>
+        </p:txBody>
+      </p:sp>
+      <p:sp>
+        <p:nvSpPr>
+          <p:cNvPr id="6" name="Segnaposto piè di pagina 5">
+            <a:extLst>
+              <a:ext uri="{FF2B5EF4-FFF2-40B4-BE49-F238E27FC236}">
+                <a16:creationId xmlns:a16="http://schemas.microsoft.com/office/drawing/2014/main" id="{3276E258-63A7-EF47-A9E2-09FA8F14BCCA}"/>
+              </a:ext>
+            </a:extLst>
+          </p:cNvPr>
+          <p:cNvSpPr>
+            <a:spLocks noGrp="1"/>
+          </p:cNvSpPr>
+          <p:nvPr>
+            <p:ph type="ftr" sz="quarter" idx="11"/>
+          </p:nvPr>
+        </p:nvSpPr>
+        <p:spPr/>
+        <p:txBody>
+          <a:bodyPr/>
+          <a:lstStyle/>
+          <a:p>
+            <a:r>
+              <a:rPr lang="it-IT" dirty="0"/>
+              <a:t>Team </a:t>
+            </a:r>
+            <a:r>
+              <a:rPr lang="it-IT" dirty="0" err="1"/>
+              <a:t>overlap</a:t>
+            </a:r>
+            <a:r>
+              <a:rPr lang="it-IT" dirty="0"/>
+              <a:t> - Laboratorio </a:t>
+            </a:r>
+            <a:r>
+              <a:rPr lang="it-IT" dirty="0" err="1"/>
+              <a:t>IoT@UniMiB</a:t>
+            </a:r>
+            <a:endParaRPr lang="it-IT" dirty="0"/>
+          </a:p>
+        </p:txBody>
+      </p:sp>
+      <p:sp>
+        <p:nvSpPr>
+          <p:cNvPr id="11" name="CasellaDiTesto 10">
+            <a:extLst>
+              <a:ext uri="{FF2B5EF4-FFF2-40B4-BE49-F238E27FC236}">
+                <a16:creationId xmlns:a16="http://schemas.microsoft.com/office/drawing/2014/main" id="{A83BA598-7D83-4D28-BA75-D0FF273D37BF}"/>
+              </a:ext>
+            </a:extLst>
+          </p:cNvPr>
+          <p:cNvSpPr txBox="1"/>
+          <p:nvPr/>
+        </p:nvSpPr>
+        <p:spPr>
+          <a:xfrm>
+            <a:off x="-1" y="1377074"/>
+            <a:ext cx="5171222" cy="3449855"/>
+          </a:xfrm>
+          <a:prstGeom prst="rect">
+            <a:avLst/>
+          </a:prstGeom>
+          <a:noFill/>
+        </p:spPr>
+        <p:txBody>
+          <a:bodyPr wrap="square" rtlCol="0">
+            <a:spAutoFit/>
+          </a:bodyPr>
+          <a:lstStyle/>
+          <a:p>
+            <a:pPr marL="421928" marR="0" lvl="1" algn="l" defTabSz="843858" rtl="0" eaLnBrk="1" fontAlgn="auto" latinLnBrk="0" hangingPunct="1">
+              <a:lnSpc>
+                <a:spcPct val="100000"/>
+              </a:lnSpc>
+              <a:spcBef>
+                <a:spcPts val="554"/>
+              </a:spcBef>
+              <a:spcAft>
+                <a:spcPts val="0"/>
+              </a:spcAft>
+              <a:buClr>
+                <a:prstClr val="black">
+                  <a:lumMod val="50000"/>
+                  <a:lumOff val="50000"/>
+                </a:prstClr>
+              </a:buClr>
+              <a:buSzPct val="75000"/>
+              <a:tabLst/>
+              <a:defRPr/>
+            </a:pPr>
+            <a:r>
+              <a:rPr kumimoji="0" lang="en-US" sz="1817" b="1" i="0" u="none" strike="noStrike" kern="1200" cap="none" spc="0" normalizeH="0" baseline="0" noProof="0" dirty="0" err="1">
+                <a:ln>
+                  <a:noFill/>
+                </a:ln>
+                <a:solidFill>
+                  <a:prstClr val="black">
+                    <a:lumMod val="75000"/>
+                    <a:lumOff val="25000"/>
+                  </a:prstClr>
+                </a:solidFill>
+                <a:effectLst/>
+                <a:uLnTx/>
+                <a:uFillTx/>
+                <a:latin typeface="Arial" panose="020B0604020202020204" pitchFamily="34" charset="0"/>
+                <a:ea typeface="+mn-ea"/>
+                <a:cs typeface="Arial" panose="020B0604020202020204" pitchFamily="34" charset="0"/>
+              </a:rPr>
+              <a:t>Specifiche</a:t>
+            </a:r>
+            <a:r>
+              <a:rPr kumimoji="0" lang="en-US" sz="1817" b="1" i="0" u="none" strike="noStrike" kern="1200" cap="none" spc="0" normalizeH="0" baseline="0" noProof="0" dirty="0">
+                <a:ln>
+                  <a:noFill/>
+                </a:ln>
+                <a:solidFill>
+                  <a:prstClr val="black">
+                    <a:lumMod val="75000"/>
+                    <a:lumOff val="25000"/>
+                  </a:prstClr>
+                </a:solidFill>
+                <a:effectLst/>
+                <a:uLnTx/>
+                <a:uFillTx/>
+                <a:latin typeface="Arial" panose="020B0604020202020204" pitchFamily="34" charset="0"/>
+                <a:ea typeface="+mn-ea"/>
+                <a:cs typeface="Arial" panose="020B0604020202020204" pitchFamily="34" charset="0"/>
+              </a:rPr>
+              <a:t> di </a:t>
+            </a:r>
+            <a:r>
+              <a:rPr lang="en-US" sz="1817" b="1" dirty="0">
+                <a:solidFill>
+                  <a:prstClr val="black">
+                    <a:lumMod val="75000"/>
+                    <a:lumOff val="25000"/>
+                  </a:prstClr>
+                </a:solidFill>
+                <a:latin typeface="Arial" panose="020B0604020202020204" pitchFamily="34" charset="0"/>
+                <a:cs typeface="Arial" panose="020B0604020202020204" pitchFamily="34" charset="0"/>
+              </a:rPr>
+              <a:t>I</a:t>
+            </a:r>
+            <a:r>
+              <a:rPr kumimoji="0" lang="en-US" sz="1817" b="1" i="0" u="none" strike="noStrike" kern="1200" cap="none" spc="0" normalizeH="0" baseline="0" noProof="0" dirty="0" err="1">
+                <a:ln>
+                  <a:noFill/>
+                </a:ln>
+                <a:solidFill>
+                  <a:prstClr val="black">
+                    <a:lumMod val="75000"/>
+                    <a:lumOff val="25000"/>
+                  </a:prstClr>
+                </a:solidFill>
+                <a:effectLst/>
+                <a:uLnTx/>
+                <a:uFillTx/>
+                <a:latin typeface="Arial" panose="020B0604020202020204" pitchFamily="34" charset="0"/>
+                <a:ea typeface="+mn-ea"/>
+                <a:cs typeface="Arial" panose="020B0604020202020204" pitchFamily="34" charset="0"/>
+              </a:rPr>
+              <a:t>mplementazione</a:t>
+            </a:r>
+            <a:r>
+              <a:rPr kumimoji="0" lang="en-US" sz="1817" b="1" i="0" u="none" strike="noStrike" kern="1200" cap="none" spc="0" normalizeH="0" baseline="0" noProof="0" dirty="0">
+                <a:ln>
+                  <a:noFill/>
+                </a:ln>
+                <a:solidFill>
+                  <a:prstClr val="black">
+                    <a:lumMod val="75000"/>
+                    <a:lumOff val="25000"/>
+                  </a:prstClr>
+                </a:solidFill>
+                <a:effectLst/>
+                <a:uLnTx/>
+                <a:uFillTx/>
+                <a:latin typeface="Arial" panose="020B0604020202020204" pitchFamily="34" charset="0"/>
+                <a:ea typeface="+mn-ea"/>
+                <a:cs typeface="Arial" panose="020B0604020202020204" pitchFamily="34" charset="0"/>
+              </a:rPr>
+              <a:t>: </a:t>
+            </a:r>
+          </a:p>
+          <a:p>
+            <a:pPr marL="421928" marR="0" lvl="1" algn="l" defTabSz="843858" rtl="0" eaLnBrk="1" fontAlgn="auto" latinLnBrk="0" hangingPunct="1">
+              <a:lnSpc>
+                <a:spcPct val="100000"/>
+              </a:lnSpc>
+              <a:spcBef>
+                <a:spcPts val="554"/>
+              </a:spcBef>
+              <a:spcAft>
+                <a:spcPts val="0"/>
+              </a:spcAft>
+              <a:buClr>
+                <a:prstClr val="black">
+                  <a:lumMod val="50000"/>
+                  <a:lumOff val="50000"/>
+                </a:prstClr>
+              </a:buClr>
+              <a:buSzPct val="75000"/>
+              <a:tabLst/>
+              <a:defRPr/>
+            </a:pPr>
+            <a:endParaRPr kumimoji="0" lang="en-US" sz="1817" b="1" i="0" u="none" strike="noStrike" kern="1200" cap="none" spc="0" normalizeH="0" baseline="0" noProof="0" dirty="0">
+              <a:ln>
+                <a:noFill/>
+              </a:ln>
+              <a:solidFill>
+                <a:prstClr val="black">
+                  <a:lumMod val="75000"/>
+                  <a:lumOff val="25000"/>
+                </a:prstClr>
+              </a:solidFill>
+              <a:effectLst/>
+              <a:uLnTx/>
+              <a:uFillTx/>
+              <a:latin typeface="Arial" panose="020B0604020202020204" pitchFamily="34" charset="0"/>
+              <a:ea typeface="+mn-ea"/>
+              <a:cs typeface="Arial" panose="020B0604020202020204" pitchFamily="34" charset="0"/>
+            </a:endParaRPr>
+          </a:p>
+          <a:p>
+            <a:pPr marL="786860" lvl="1" indent="-421930" defTabSz="843858">
+              <a:spcBef>
+                <a:spcPts val="554"/>
+              </a:spcBef>
+              <a:buClr>
+                <a:prstClr val="black">
+                  <a:lumMod val="75000"/>
+                  <a:lumOff val="25000"/>
+                </a:prstClr>
+              </a:buClr>
+              <a:buSzPct val="75000"/>
+              <a:buFont typeface="Arial" panose="020B0604020202020204" pitchFamily="34" charset="0"/>
+              <a:buChar char="•"/>
+              <a:defRPr/>
+            </a:pPr>
+            <a:r>
+              <a:rPr lang="pt-BR" sz="1687" dirty="0">
+                <a:solidFill>
+                  <a:prstClr val="black">
+                    <a:lumMod val="75000"/>
+                    <a:lumOff val="25000"/>
+                  </a:prstClr>
+                </a:solidFill>
+                <a:latin typeface="Arial" panose="020B0604020202020204" pitchFamily="34" charset="0"/>
+                <a:cs typeface="Arial" panose="020B0604020202020204" pitchFamily="34" charset="0"/>
+              </a:rPr>
+              <a:t>I terremoti segnalati agli utenti sono sia quelli rilevati dal sismografo che ricevuti dalle API</a:t>
+            </a:r>
+          </a:p>
+          <a:p>
+            <a:pPr marL="364930" lvl="1" defTabSz="843858">
+              <a:spcBef>
+                <a:spcPts val="554"/>
+              </a:spcBef>
+              <a:buClr>
+                <a:prstClr val="black">
+                  <a:lumMod val="75000"/>
+                  <a:lumOff val="25000"/>
+                </a:prstClr>
+              </a:buClr>
+              <a:buSzPct val="75000"/>
+              <a:defRPr/>
+            </a:pPr>
+            <a:endParaRPr lang="pt-BR" sz="1687" dirty="0">
+              <a:solidFill>
+                <a:prstClr val="black">
+                  <a:lumMod val="75000"/>
+                  <a:lumOff val="25000"/>
+                </a:prstClr>
+              </a:solidFill>
+              <a:latin typeface="Arial" panose="020B0604020202020204" pitchFamily="34" charset="0"/>
+              <a:cs typeface="Arial" panose="020B0604020202020204" pitchFamily="34" charset="0"/>
+            </a:endParaRPr>
+          </a:p>
+          <a:p>
+            <a:pPr marL="786860" lvl="1" indent="-421930" defTabSz="843858">
+              <a:spcBef>
+                <a:spcPts val="554"/>
+              </a:spcBef>
+              <a:buClr>
+                <a:prstClr val="black">
+                  <a:lumMod val="75000"/>
+                  <a:lumOff val="25000"/>
+                </a:prstClr>
+              </a:buClr>
+              <a:buSzPct val="75000"/>
+              <a:buFont typeface="Arial" panose="020B0604020202020204" pitchFamily="34" charset="0"/>
+              <a:buChar char="•"/>
+              <a:defRPr/>
+            </a:pPr>
+            <a:r>
+              <a:rPr lang="pt-BR" sz="1687" dirty="0">
+                <a:solidFill>
+                  <a:prstClr val="black">
+                    <a:lumMod val="75000"/>
+                    <a:lumOff val="25000"/>
+                  </a:prstClr>
+                </a:solidFill>
+                <a:latin typeface="Arial" panose="020B0604020202020204" pitchFamily="34" charset="0"/>
+                <a:cs typeface="Arial" panose="020B0604020202020204" pitchFamily="34" charset="0"/>
+              </a:rPr>
+              <a:t>Libreria utilizzata: </a:t>
+            </a:r>
+            <a:r>
+              <a:rPr lang="pt-BR" sz="1687" i="1" dirty="0">
+                <a:solidFill>
+                  <a:prstClr val="black">
+                    <a:lumMod val="75000"/>
+                    <a:lumOff val="25000"/>
+                  </a:prstClr>
+                </a:solidFill>
+                <a:latin typeface="Arial" panose="020B0604020202020204" pitchFamily="34" charset="0"/>
+                <a:cs typeface="Arial" panose="020B0604020202020204" pitchFamily="34" charset="0"/>
+              </a:rPr>
+              <a:t>python-telegram-bot </a:t>
+            </a:r>
+            <a:r>
+              <a:rPr lang="pt-BR" sz="1687" dirty="0">
+                <a:solidFill>
+                  <a:prstClr val="black">
+                    <a:lumMod val="75000"/>
+                    <a:lumOff val="25000"/>
+                  </a:prstClr>
+                </a:solidFill>
+                <a:latin typeface="Arial" panose="020B0604020202020204" pitchFamily="34" charset="0"/>
+                <a:cs typeface="Arial" panose="020B0604020202020204" pitchFamily="34" charset="0"/>
+              </a:rPr>
+              <a:t>(asincrona)</a:t>
+            </a:r>
+          </a:p>
+          <a:p>
+            <a:pPr marL="786860" lvl="1" indent="-421930" defTabSz="843858">
+              <a:spcBef>
+                <a:spcPts val="554"/>
+              </a:spcBef>
+              <a:buClr>
+                <a:prstClr val="black">
+                  <a:lumMod val="75000"/>
+                  <a:lumOff val="25000"/>
+                </a:prstClr>
+              </a:buClr>
+              <a:buSzPct val="75000"/>
+              <a:buFont typeface="Arial" panose="020B0604020202020204" pitchFamily="34" charset="0"/>
+              <a:buChar char="•"/>
+              <a:defRPr/>
+            </a:pPr>
+            <a:r>
+              <a:rPr lang="pt-BR" sz="1687" dirty="0">
+                <a:solidFill>
+                  <a:prstClr val="black">
+                    <a:lumMod val="75000"/>
+                    <a:lumOff val="25000"/>
+                  </a:prstClr>
+                </a:solidFill>
+                <a:latin typeface="Arial" panose="020B0604020202020204" pitchFamily="34" charset="0"/>
+                <a:cs typeface="Arial" panose="020B0604020202020204" pitchFamily="34" charset="0"/>
+              </a:rPr>
+              <a:t>L’intero master-node è stato riprogettato per poter girare attorno ad </a:t>
+            </a:r>
+            <a:r>
+              <a:rPr lang="pt-BR" sz="1687" i="1" dirty="0">
+                <a:solidFill>
+                  <a:prstClr val="black">
+                    <a:lumMod val="75000"/>
+                    <a:lumOff val="25000"/>
+                  </a:prstClr>
+                </a:solidFill>
+                <a:latin typeface="Arial" panose="020B0604020202020204" pitchFamily="34" charset="0"/>
+                <a:cs typeface="Arial" panose="020B0604020202020204" pitchFamily="34" charset="0"/>
+              </a:rPr>
+              <a:t>asyncio</a:t>
+            </a:r>
+            <a:endParaRPr lang="pt-BR" sz="1687" dirty="0">
+              <a:solidFill>
+                <a:prstClr val="black">
+                  <a:lumMod val="75000"/>
+                  <a:lumOff val="25000"/>
+                </a:prstClr>
+              </a:solidFill>
+              <a:latin typeface="Arial" panose="020B0604020202020204" pitchFamily="34" charset="0"/>
+              <a:cs typeface="Arial" panose="020B0604020202020204" pitchFamily="34" charset="0"/>
+            </a:endParaRPr>
+          </a:p>
+          <a:p>
+            <a:pPr marL="786860" lvl="1" indent="-421930" defTabSz="843858">
+              <a:spcBef>
+                <a:spcPts val="554"/>
+              </a:spcBef>
+              <a:buClr>
+                <a:prstClr val="black">
+                  <a:lumMod val="75000"/>
+                  <a:lumOff val="25000"/>
+                </a:prstClr>
+              </a:buClr>
+              <a:buSzPct val="75000"/>
+              <a:buFont typeface="Arial" panose="020B0604020202020204" pitchFamily="34" charset="0"/>
+              <a:buChar char="•"/>
+              <a:defRPr/>
+            </a:pPr>
+            <a:endParaRPr lang="pt-BR" sz="1687" dirty="0">
+              <a:solidFill>
+                <a:prstClr val="black">
+                  <a:lumMod val="75000"/>
+                  <a:lumOff val="25000"/>
+                </a:prstClr>
+              </a:solidFill>
+              <a:latin typeface="Arial" panose="020B0604020202020204" pitchFamily="34" charset="0"/>
+              <a:cs typeface="Arial" panose="020B0604020202020204" pitchFamily="34" charset="0"/>
+            </a:endParaRPr>
+          </a:p>
+        </p:txBody>
+      </p:sp>
+      <p:pic>
+        <p:nvPicPr>
+          <p:cNvPr id="12" name="Immagine 11">
+            <a:extLst>
+              <a:ext uri="{FF2B5EF4-FFF2-40B4-BE49-F238E27FC236}">
+                <a16:creationId xmlns:a16="http://schemas.microsoft.com/office/drawing/2014/main" id="{5520794F-A8E6-A15E-C7D2-FCD2E4F979BB}"/>
+              </a:ext>
+            </a:extLst>
+          </p:cNvPr>
+          <p:cNvPicPr>
+            <a:picLocks noChangeAspect="1"/>
+          </p:cNvPicPr>
+          <p:nvPr/>
+        </p:nvPicPr>
+        <p:blipFill>
+          <a:blip r:embed="rId2"/>
+          <a:srcRect/>
+          <a:stretch/>
+        </p:blipFill>
+        <p:spPr>
+          <a:xfrm>
+            <a:off x="5838082" y="1065501"/>
+            <a:ext cx="2708407" cy="5256316"/>
+          </a:xfrm>
+          <a:prstGeom prst="rect">
+            <a:avLst/>
+          </a:prstGeom>
+        </p:spPr>
+      </p:pic>
+    </p:spTree>
+    <p:extLst>
+      <p:ext uri="{BB962C8B-B14F-4D97-AF65-F5344CB8AC3E}">
+        <p14:creationId xmlns:p14="http://schemas.microsoft.com/office/powerpoint/2010/main" val="1380741558"/>
+      </p:ext>
+    </p:extLst>
+  </p:cSld>
+  <p:clrMapOvr>
+    <a:masterClrMapping/>
+  </p:clrMapOvr>
+</p:sld>
+</file>
+
+<file path=ppt/slides/slide11.xml><?xml version="1.0" encoding="utf-8"?>
 <p:sld xmlns:a="http://schemas.openxmlformats.org/drawingml/2006/main" xmlns:r="http://schemas.openxmlformats.org/officeDocument/2006/relationships" xmlns:p="http://schemas.openxmlformats.org/presentationml/2006/main">
   <p:cSld>
     <p:spTree>
@@ -9612,7 +10173,7 @@
             <a:fld id="{389832E7-CD1C-8649-98ED-2ABDE863B9F8}" type="slidenum">
               <a:rPr lang="it-IT" smtClean="0"/>
               <a:pPr/>
-              <a:t>10</a:t>
+              <a:t>11</a:t>
             </a:fld>
             <a:endParaRPr lang="it-IT" dirty="0" err="1"/>
           </a:p>
@@ -9738,7 +10299,7 @@
 </p:sld>
 </file>
 
-<file path=ppt/slides/slide11.xml><?xml version="1.0" encoding="utf-8"?>
+<file path=ppt/slides/slide12.xml><?xml version="1.0" encoding="utf-8"?>
 <p:sld xmlns:a="http://schemas.openxmlformats.org/drawingml/2006/main" xmlns:r="http://schemas.openxmlformats.org/officeDocument/2006/relationships" xmlns:p="http://schemas.openxmlformats.org/presentationml/2006/main">
   <p:cSld>
     <p:spTree>
@@ -10425,7 +10986,7 @@
             <a:fld id="{389832E7-CD1C-8649-98ED-2ABDE863B9F8}" type="slidenum">
               <a:rPr lang="it-IT" smtClean="0"/>
               <a:pPr/>
-              <a:t>11</a:t>
+              <a:t>12</a:t>
             </a:fld>
             <a:endParaRPr lang="it-IT" dirty="0" err="1"/>
           </a:p>
@@ -12816,7 +13377,7 @@
           <a:p>
             <a:r>
               <a:rPr lang="en-US" dirty="0"/>
-              <a:t>Method: API Usage</a:t>
+              <a:t>Method: Low Power Consumption</a:t>
             </a:r>
           </a:p>
         </p:txBody>
@@ -12846,6 +13407,875 @@
               <a:rPr lang="it-IT" smtClean="0"/>
               <a:pPr/>
               <a:t>7</a:t>
+            </a:fld>
+            <a:endParaRPr lang="it-IT" dirty="0" err="1"/>
+          </a:p>
+        </p:txBody>
+      </p:sp>
+      <p:sp>
+        <p:nvSpPr>
+          <p:cNvPr id="5" name="Segnaposto contenuto 4">
+            <a:extLst>
+              <a:ext uri="{FF2B5EF4-FFF2-40B4-BE49-F238E27FC236}">
+                <a16:creationId xmlns:a16="http://schemas.microsoft.com/office/drawing/2014/main" id="{5790AEF5-1816-BB41-AD38-B2380590B075}"/>
+              </a:ext>
+            </a:extLst>
+          </p:cNvPr>
+          <p:cNvSpPr>
+            <a:spLocks noGrp="1"/>
+          </p:cNvSpPr>
+          <p:nvPr>
+            <p:ph sz="quarter" idx="13"/>
+          </p:nvPr>
+        </p:nvSpPr>
+        <p:spPr/>
+        <p:txBody>
+          <a:bodyPr/>
+          <a:lstStyle/>
+          <a:p>
+            <a:r>
+              <a:rPr lang="en-US" dirty="0"/>
+              <a:t>Description system: choices, parameters, use cases</a:t>
+            </a:r>
+          </a:p>
+        </p:txBody>
+      </p:sp>
+      <p:sp>
+        <p:nvSpPr>
+          <p:cNvPr id="6" name="Segnaposto piè di pagina 5">
+            <a:extLst>
+              <a:ext uri="{FF2B5EF4-FFF2-40B4-BE49-F238E27FC236}">
+                <a16:creationId xmlns:a16="http://schemas.microsoft.com/office/drawing/2014/main" id="{3276E258-63A7-EF47-A9E2-09FA8F14BCCA}"/>
+              </a:ext>
+            </a:extLst>
+          </p:cNvPr>
+          <p:cNvSpPr>
+            <a:spLocks noGrp="1"/>
+          </p:cNvSpPr>
+          <p:nvPr>
+            <p:ph type="ftr" sz="quarter" idx="11"/>
+          </p:nvPr>
+        </p:nvSpPr>
+        <p:spPr/>
+        <p:txBody>
+          <a:bodyPr/>
+          <a:lstStyle/>
+          <a:p>
+            <a:r>
+              <a:rPr lang="it-IT" dirty="0"/>
+              <a:t>Team </a:t>
+            </a:r>
+            <a:r>
+              <a:rPr lang="it-IT" dirty="0" err="1"/>
+              <a:t>overlap</a:t>
+            </a:r>
+            <a:r>
+              <a:rPr lang="it-IT" dirty="0"/>
+              <a:t> - Laboratorio </a:t>
+            </a:r>
+            <a:r>
+              <a:rPr lang="it-IT" dirty="0" err="1"/>
+              <a:t>IoT@UniMiB</a:t>
+            </a:r>
+            <a:endParaRPr lang="it-IT" dirty="0"/>
+          </a:p>
+        </p:txBody>
+      </p:sp>
+      <p:pic>
+        <p:nvPicPr>
+          <p:cNvPr id="7" name="Segnaposto contenuto 7">
+            <a:extLst>
+              <a:ext uri="{FF2B5EF4-FFF2-40B4-BE49-F238E27FC236}">
+                <a16:creationId xmlns:a16="http://schemas.microsoft.com/office/drawing/2014/main" id="{7E0CA7AB-F245-4144-BF39-B72F4A332CE5}"/>
+              </a:ext>
+            </a:extLst>
+          </p:cNvPr>
+          <p:cNvPicPr>
+            <a:picLocks noGrp="1" noChangeAspect="1"/>
+          </p:cNvPicPr>
+          <p:nvPr>
+            <p:ph idx="1"/>
+          </p:nvPr>
+        </p:nvPicPr>
+        <p:blipFill>
+          <a:blip r:embed="rId2"/>
+          <a:srcRect t="3399" b="3399"/>
+          <a:stretch/>
+        </p:blipFill>
+        <p:spPr>
+          <a:xfrm>
+            <a:off x="117501" y="4207778"/>
+            <a:ext cx="0" cy="0"/>
+          </a:xfrm>
+        </p:spPr>
+      </p:pic>
+      <p:sp>
+        <p:nvSpPr>
+          <p:cNvPr id="8" name="CasellaDiTesto 7">
+            <a:extLst>
+              <a:ext uri="{FF2B5EF4-FFF2-40B4-BE49-F238E27FC236}">
+                <a16:creationId xmlns:a16="http://schemas.microsoft.com/office/drawing/2014/main" id="{86429F7C-3D6A-490C-8588-BE4C1F28BF2F}"/>
+              </a:ext>
+            </a:extLst>
+          </p:cNvPr>
+          <p:cNvSpPr txBox="1"/>
+          <p:nvPr/>
+        </p:nvSpPr>
+        <p:spPr>
+          <a:xfrm>
+            <a:off x="3909147" y="5006214"/>
+            <a:ext cx="5292652" cy="1564339"/>
+          </a:xfrm>
+          <a:prstGeom prst="rect">
+            <a:avLst/>
+          </a:prstGeom>
+          <a:noFill/>
+        </p:spPr>
+        <p:txBody>
+          <a:bodyPr wrap="square" rtlCol="0">
+            <a:spAutoFit/>
+          </a:bodyPr>
+          <a:lstStyle/>
+          <a:p>
+            <a:pPr marL="421928" marR="0" lvl="1" indent="0" algn="l" defTabSz="843858" rtl="0" eaLnBrk="1" fontAlgn="auto" latinLnBrk="0" hangingPunct="1">
+              <a:lnSpc>
+                <a:spcPct val="100000"/>
+              </a:lnSpc>
+              <a:spcBef>
+                <a:spcPts val="554"/>
+              </a:spcBef>
+              <a:spcAft>
+                <a:spcPts val="0"/>
+              </a:spcAft>
+              <a:buClr>
+                <a:prstClr val="black">
+                  <a:lumMod val="50000"/>
+                  <a:lumOff val="50000"/>
+                </a:prstClr>
+              </a:buClr>
+              <a:buSzPct val="75000"/>
+              <a:buFontTx/>
+              <a:buNone/>
+              <a:tabLst/>
+              <a:defRPr/>
+            </a:pPr>
+            <a:r>
+              <a:rPr kumimoji="0" lang="en-US" sz="1817" b="1" i="0" u="none" strike="noStrike" kern="1200" cap="none" spc="0" normalizeH="0" baseline="0" noProof="0" dirty="0">
+                <a:ln>
+                  <a:noFill/>
+                </a:ln>
+                <a:solidFill>
+                  <a:prstClr val="black">
+                    <a:lumMod val="75000"/>
+                    <a:lumOff val="25000"/>
+                  </a:prstClr>
+                </a:solidFill>
+                <a:effectLst/>
+                <a:uLnTx/>
+                <a:uFillTx/>
+                <a:latin typeface="Arial" panose="020B0604020202020204" pitchFamily="34" charset="0"/>
+                <a:ea typeface="+mn-ea"/>
+                <a:cs typeface="Arial" panose="020B0604020202020204" pitchFamily="34" charset="0"/>
+              </a:rPr>
+              <a:t>IDLE sleep mode: </a:t>
+            </a:r>
+          </a:p>
+          <a:p>
+            <a:pPr marL="786860" marR="0" lvl="1" indent="-421930" algn="l" defTabSz="843858" rtl="0" eaLnBrk="1" fontAlgn="auto" latinLnBrk="0" hangingPunct="1">
+              <a:lnSpc>
+                <a:spcPct val="100000"/>
+              </a:lnSpc>
+              <a:spcBef>
+                <a:spcPts val="554"/>
+              </a:spcBef>
+              <a:spcAft>
+                <a:spcPts val="0"/>
+              </a:spcAft>
+              <a:buClr>
+                <a:prstClr val="black">
+                  <a:lumMod val="75000"/>
+                  <a:lumOff val="25000"/>
+                </a:prstClr>
+              </a:buClr>
+              <a:buSzPct val="75000"/>
+              <a:buFont typeface="Arial" panose="020B0604020202020204" pitchFamily="34" charset="0"/>
+              <a:buChar char="•"/>
+              <a:tabLst/>
+              <a:defRPr/>
+            </a:pPr>
+            <a:r>
+              <a:rPr kumimoji="0" lang="pt-BR" sz="1687" b="0" i="0" u="none" strike="noStrike" kern="1200" cap="none" spc="0" normalizeH="0" baseline="0" noProof="0" dirty="0">
+                <a:ln>
+                  <a:noFill/>
+                </a:ln>
+                <a:solidFill>
+                  <a:prstClr val="black">
+                    <a:lumMod val="75000"/>
+                    <a:lumOff val="25000"/>
+                  </a:prstClr>
+                </a:solidFill>
+                <a:effectLst/>
+                <a:uLnTx/>
+                <a:uFillTx/>
+                <a:latin typeface="Arial" panose="020B0604020202020204" pitchFamily="34" charset="0"/>
+                <a:ea typeface="+mn-ea"/>
+                <a:cs typeface="Arial" panose="020B0604020202020204" pitchFamily="34" charset="0"/>
+              </a:rPr>
+              <a:t>A seguito di ogni lettura dell’accelerometro la board entra in IDLE mode per 25ms</a:t>
+            </a:r>
+          </a:p>
+          <a:p>
+            <a:pPr marL="786860" marR="0" lvl="1" indent="-421930" algn="l" defTabSz="843858" rtl="0" eaLnBrk="1" fontAlgn="auto" latinLnBrk="0" hangingPunct="1">
+              <a:lnSpc>
+                <a:spcPct val="100000"/>
+              </a:lnSpc>
+              <a:spcBef>
+                <a:spcPts val="554"/>
+              </a:spcBef>
+              <a:spcAft>
+                <a:spcPts val="0"/>
+              </a:spcAft>
+              <a:buClr>
+                <a:prstClr val="black">
+                  <a:lumMod val="75000"/>
+                  <a:lumOff val="25000"/>
+                </a:prstClr>
+              </a:buClr>
+              <a:buSzPct val="75000"/>
+              <a:buFont typeface="Arial" panose="020B0604020202020204" pitchFamily="34" charset="0"/>
+              <a:buChar char="•"/>
+              <a:tabLst/>
+              <a:defRPr/>
+            </a:pPr>
+            <a:r>
+              <a:rPr lang="pt-BR" sz="1687" dirty="0">
+                <a:solidFill>
+                  <a:prstClr val="black">
+                    <a:lumMod val="75000"/>
+                    <a:lumOff val="25000"/>
+                  </a:prstClr>
+                </a:solidFill>
+                <a:latin typeface="Arial" panose="020B0604020202020204" pitchFamily="34" charset="0"/>
+                <a:cs typeface="Arial" panose="020B0604020202020204" pitchFamily="34" charset="0"/>
+              </a:rPr>
+              <a:t>CPU stoppata e aumento dell’efficienza di wake-up time</a:t>
+            </a:r>
+            <a:endParaRPr kumimoji="0" lang="pt-BR" sz="1687" b="0" i="0" u="none" strike="noStrike" kern="1200" cap="none" spc="0" normalizeH="0" baseline="0" noProof="0" dirty="0">
+              <a:ln>
+                <a:noFill/>
+              </a:ln>
+              <a:solidFill>
+                <a:prstClr val="black">
+                  <a:lumMod val="75000"/>
+                  <a:lumOff val="25000"/>
+                </a:prstClr>
+              </a:solidFill>
+              <a:effectLst/>
+              <a:uLnTx/>
+              <a:uFillTx/>
+              <a:latin typeface="Arial" panose="020B0604020202020204" pitchFamily="34" charset="0"/>
+              <a:ea typeface="+mn-ea"/>
+              <a:cs typeface="Arial" panose="020B0604020202020204" pitchFamily="34" charset="0"/>
+            </a:endParaRPr>
+          </a:p>
+        </p:txBody>
+      </p:sp>
+      <p:sp>
+        <p:nvSpPr>
+          <p:cNvPr id="11" name="CasellaDiTesto 10">
+            <a:extLst>
+              <a:ext uri="{FF2B5EF4-FFF2-40B4-BE49-F238E27FC236}">
+                <a16:creationId xmlns:a16="http://schemas.microsoft.com/office/drawing/2014/main" id="{A83BA598-7D83-4D28-BA75-D0FF273D37BF}"/>
+              </a:ext>
+            </a:extLst>
+          </p:cNvPr>
+          <p:cNvSpPr txBox="1"/>
+          <p:nvPr/>
+        </p:nvSpPr>
+        <p:spPr>
+          <a:xfrm>
+            <a:off x="3909147" y="939984"/>
+            <a:ext cx="5171222" cy="1900905"/>
+          </a:xfrm>
+          <a:prstGeom prst="rect">
+            <a:avLst/>
+          </a:prstGeom>
+          <a:noFill/>
+        </p:spPr>
+        <p:txBody>
+          <a:bodyPr wrap="square" rtlCol="0">
+            <a:spAutoFit/>
+          </a:bodyPr>
+          <a:lstStyle/>
+          <a:p>
+            <a:pPr marL="421928" marR="0" lvl="1" indent="0" algn="l" defTabSz="843858" rtl="0" eaLnBrk="1" fontAlgn="auto" latinLnBrk="0" hangingPunct="1">
+              <a:lnSpc>
+                <a:spcPct val="100000"/>
+              </a:lnSpc>
+              <a:spcBef>
+                <a:spcPts val="554"/>
+              </a:spcBef>
+              <a:spcAft>
+                <a:spcPts val="0"/>
+              </a:spcAft>
+              <a:buClr>
+                <a:prstClr val="black">
+                  <a:lumMod val="50000"/>
+                  <a:lumOff val="50000"/>
+                </a:prstClr>
+              </a:buClr>
+              <a:buSzPct val="75000"/>
+              <a:buFontTx/>
+              <a:buNone/>
+              <a:tabLst/>
+              <a:defRPr/>
+            </a:pPr>
+            <a:r>
+              <a:rPr kumimoji="0" lang="en-US" sz="1817" b="1" i="0" u="none" strike="noStrike" kern="1200" cap="none" spc="0" normalizeH="0" baseline="0" noProof="0" dirty="0" err="1">
+                <a:ln>
+                  <a:noFill/>
+                </a:ln>
+                <a:solidFill>
+                  <a:prstClr val="black">
+                    <a:lumMod val="75000"/>
+                    <a:lumOff val="25000"/>
+                  </a:prstClr>
+                </a:solidFill>
+                <a:effectLst/>
+                <a:uLnTx/>
+                <a:uFillTx/>
+                <a:latin typeface="Arial" panose="020B0604020202020204" pitchFamily="34" charset="0"/>
+                <a:ea typeface="+mn-ea"/>
+                <a:cs typeface="Arial" panose="020B0604020202020204" pitchFamily="34" charset="0"/>
+              </a:rPr>
+              <a:t>Proprietà</a:t>
+            </a:r>
+            <a:r>
+              <a:rPr kumimoji="0" lang="en-US" sz="1817" b="1" i="0" u="none" strike="noStrike" kern="1200" cap="none" spc="0" normalizeH="0" baseline="0" noProof="0" dirty="0">
+                <a:ln>
+                  <a:noFill/>
+                </a:ln>
+                <a:solidFill>
+                  <a:prstClr val="black">
+                    <a:lumMod val="75000"/>
+                    <a:lumOff val="25000"/>
+                  </a:prstClr>
+                </a:solidFill>
+                <a:effectLst/>
+                <a:uLnTx/>
+                <a:uFillTx/>
+                <a:latin typeface="Arial" panose="020B0604020202020204" pitchFamily="34" charset="0"/>
+                <a:ea typeface="+mn-ea"/>
+                <a:cs typeface="Arial" panose="020B0604020202020204" pitchFamily="34" charset="0"/>
+              </a:rPr>
+              <a:t> del Sistema: </a:t>
+            </a:r>
+          </a:p>
+          <a:p>
+            <a:pPr marL="786860" marR="0" lvl="1" indent="-421930" algn="l" defTabSz="843858" rtl="0" eaLnBrk="1" fontAlgn="auto" latinLnBrk="0" hangingPunct="1">
+              <a:lnSpc>
+                <a:spcPct val="100000"/>
+              </a:lnSpc>
+              <a:spcBef>
+                <a:spcPts val="554"/>
+              </a:spcBef>
+              <a:spcAft>
+                <a:spcPts val="0"/>
+              </a:spcAft>
+              <a:buClr>
+                <a:prstClr val="black">
+                  <a:lumMod val="75000"/>
+                  <a:lumOff val="25000"/>
+                </a:prstClr>
+              </a:buClr>
+              <a:buSzPct val="75000"/>
+              <a:buFont typeface="Arial" panose="020B0604020202020204" pitchFamily="34" charset="0"/>
+              <a:buChar char="•"/>
+              <a:tabLst/>
+              <a:defRPr/>
+            </a:pPr>
+            <a:r>
+              <a:rPr kumimoji="0" lang="pt-BR" sz="1687" b="0" i="0" u="none" strike="noStrike" kern="1200" cap="none" spc="0" normalizeH="0" baseline="0" noProof="0" dirty="0">
+                <a:ln>
+                  <a:noFill/>
+                </a:ln>
+                <a:solidFill>
+                  <a:prstClr val="black">
+                    <a:lumMod val="75000"/>
+                    <a:lumOff val="25000"/>
+                  </a:prstClr>
+                </a:solidFill>
+                <a:effectLst/>
+                <a:uLnTx/>
+                <a:uFillTx/>
+                <a:latin typeface="Arial" panose="020B0604020202020204" pitchFamily="34" charset="0"/>
+                <a:ea typeface="+mn-ea"/>
+                <a:cs typeface="Arial" panose="020B0604020202020204" pitchFamily="34" charset="0"/>
+              </a:rPr>
+              <a:t>Sistema di rilevazione time sensitive</a:t>
+            </a:r>
+          </a:p>
+          <a:p>
+            <a:pPr marL="786860" marR="0" lvl="1" indent="-421930" algn="l" defTabSz="843858" rtl="0" eaLnBrk="1" fontAlgn="auto" latinLnBrk="0" hangingPunct="1">
+              <a:lnSpc>
+                <a:spcPct val="100000"/>
+              </a:lnSpc>
+              <a:spcBef>
+                <a:spcPts val="554"/>
+              </a:spcBef>
+              <a:spcAft>
+                <a:spcPts val="0"/>
+              </a:spcAft>
+              <a:buClr>
+                <a:prstClr val="black">
+                  <a:lumMod val="75000"/>
+                  <a:lumOff val="25000"/>
+                </a:prstClr>
+              </a:buClr>
+              <a:buSzPct val="75000"/>
+              <a:buFont typeface="Arial" panose="020B0604020202020204" pitchFamily="34" charset="0"/>
+              <a:buChar char="•"/>
+              <a:tabLst/>
+              <a:defRPr/>
+            </a:pPr>
+            <a:r>
+              <a:rPr lang="pt-BR" sz="1687" dirty="0">
+                <a:solidFill>
+                  <a:prstClr val="black">
+                    <a:lumMod val="75000"/>
+                    <a:lumOff val="25000"/>
+                  </a:prstClr>
+                </a:solidFill>
+                <a:latin typeface="Arial" panose="020B0604020202020204" pitchFamily="34" charset="0"/>
+                <a:cs typeface="Arial" panose="020B0604020202020204" pitchFamily="34" charset="0"/>
+              </a:rPr>
+              <a:t>Necessità di rilevazioni costanti e in tempo reale</a:t>
+            </a:r>
+          </a:p>
+          <a:p>
+            <a:pPr marL="786860" marR="0" lvl="1" indent="-421930" algn="l" defTabSz="843858" rtl="0" eaLnBrk="1" fontAlgn="auto" latinLnBrk="0" hangingPunct="1">
+              <a:lnSpc>
+                <a:spcPct val="100000"/>
+              </a:lnSpc>
+              <a:spcBef>
+                <a:spcPts val="554"/>
+              </a:spcBef>
+              <a:spcAft>
+                <a:spcPts val="0"/>
+              </a:spcAft>
+              <a:buClr>
+                <a:prstClr val="black">
+                  <a:lumMod val="75000"/>
+                  <a:lumOff val="25000"/>
+                </a:prstClr>
+              </a:buClr>
+              <a:buSzPct val="75000"/>
+              <a:buFont typeface="Arial" panose="020B0604020202020204" pitchFamily="34" charset="0"/>
+              <a:buChar char="•"/>
+              <a:tabLst/>
+              <a:defRPr/>
+            </a:pPr>
+            <a:r>
+              <a:rPr lang="pt-BR" sz="1687" dirty="0">
+                <a:solidFill>
+                  <a:prstClr val="black">
+                    <a:lumMod val="75000"/>
+                    <a:lumOff val="25000"/>
+                  </a:prstClr>
+                </a:solidFill>
+                <a:latin typeface="Arial" panose="020B0604020202020204" pitchFamily="34" charset="0"/>
+                <a:cs typeface="Arial" panose="020B0604020202020204" pitchFamily="34" charset="0"/>
+              </a:rPr>
+              <a:t>Non c’è la possibilità di rimanere in uno stato di Sleep per tempi prolungati</a:t>
+            </a:r>
+          </a:p>
+        </p:txBody>
+      </p:sp>
+      <p:sp>
+        <p:nvSpPr>
+          <p:cNvPr id="13" name="CasellaDiTesto 12">
+            <a:extLst>
+              <a:ext uri="{FF2B5EF4-FFF2-40B4-BE49-F238E27FC236}">
+                <a16:creationId xmlns:a16="http://schemas.microsoft.com/office/drawing/2014/main" id="{D67B66B3-CF67-4C9E-904B-6B9F6C42D3AA}"/>
+              </a:ext>
+            </a:extLst>
+          </p:cNvPr>
+          <p:cNvSpPr txBox="1"/>
+          <p:nvPr/>
+        </p:nvSpPr>
+        <p:spPr>
+          <a:xfrm>
+            <a:off x="3950390" y="2973099"/>
+            <a:ext cx="4633274" cy="1900905"/>
+          </a:xfrm>
+          <a:prstGeom prst="rect">
+            <a:avLst/>
+          </a:prstGeom>
+          <a:noFill/>
+        </p:spPr>
+        <p:txBody>
+          <a:bodyPr wrap="square">
+            <a:spAutoFit/>
+          </a:bodyPr>
+          <a:lstStyle/>
+          <a:p>
+            <a:pPr marL="421928" marR="0" lvl="1" indent="0" algn="l" defTabSz="843858" rtl="0" eaLnBrk="1" fontAlgn="auto" latinLnBrk="0" hangingPunct="1">
+              <a:lnSpc>
+                <a:spcPct val="100000"/>
+              </a:lnSpc>
+              <a:spcBef>
+                <a:spcPts val="554"/>
+              </a:spcBef>
+              <a:spcAft>
+                <a:spcPts val="0"/>
+              </a:spcAft>
+              <a:buClr>
+                <a:prstClr val="black">
+                  <a:lumMod val="50000"/>
+                  <a:lumOff val="50000"/>
+                </a:prstClr>
+              </a:buClr>
+              <a:buSzPct val="75000"/>
+              <a:buFontTx/>
+              <a:buNone/>
+              <a:tabLst/>
+              <a:defRPr/>
+            </a:pPr>
+            <a:r>
+              <a:rPr lang="en-US" sz="1817" b="1" dirty="0" err="1">
+                <a:solidFill>
+                  <a:prstClr val="black">
+                    <a:lumMod val="75000"/>
+                    <a:lumOff val="25000"/>
+                  </a:prstClr>
+                </a:solidFill>
+                <a:latin typeface="Arial" panose="020B0604020202020204" pitchFamily="34" charset="0"/>
+                <a:cs typeface="Arial" panose="020B0604020202020204" pitchFamily="34" charset="0"/>
+              </a:rPr>
+              <a:t>Disabilitazione</a:t>
+            </a:r>
+            <a:r>
+              <a:rPr lang="en-US" sz="1817" b="1" dirty="0">
+                <a:solidFill>
+                  <a:prstClr val="black">
+                    <a:lumMod val="75000"/>
+                    <a:lumOff val="25000"/>
+                  </a:prstClr>
+                </a:solidFill>
+                <a:latin typeface="Arial" panose="020B0604020202020204" pitchFamily="34" charset="0"/>
+                <a:cs typeface="Arial" panose="020B0604020202020204" pitchFamily="34" charset="0"/>
+              </a:rPr>
+              <a:t> </a:t>
+            </a:r>
+            <a:r>
+              <a:rPr lang="en-US" sz="1817" b="1" dirty="0" err="1">
+                <a:solidFill>
+                  <a:prstClr val="black">
+                    <a:lumMod val="75000"/>
+                    <a:lumOff val="25000"/>
+                  </a:prstClr>
+                </a:solidFill>
+                <a:latin typeface="Arial" panose="020B0604020202020204" pitchFamily="34" charset="0"/>
+                <a:cs typeface="Arial" panose="020B0604020202020204" pitchFamily="34" charset="0"/>
+              </a:rPr>
+              <a:t>delle</a:t>
+            </a:r>
+            <a:r>
+              <a:rPr lang="en-US" sz="1817" b="1" dirty="0">
+                <a:solidFill>
+                  <a:prstClr val="black">
+                    <a:lumMod val="75000"/>
+                    <a:lumOff val="25000"/>
+                  </a:prstClr>
+                </a:solidFill>
+                <a:latin typeface="Arial" panose="020B0604020202020204" pitchFamily="34" charset="0"/>
+                <a:cs typeface="Arial" panose="020B0604020202020204" pitchFamily="34" charset="0"/>
+              </a:rPr>
+              <a:t> </a:t>
+            </a:r>
+            <a:r>
+              <a:rPr lang="en-US" sz="1817" b="1" dirty="0" err="1">
+                <a:solidFill>
+                  <a:prstClr val="black">
+                    <a:lumMod val="75000"/>
+                    <a:lumOff val="25000"/>
+                  </a:prstClr>
+                </a:solidFill>
+                <a:latin typeface="Arial" panose="020B0604020202020204" pitchFamily="34" charset="0"/>
+                <a:cs typeface="Arial" panose="020B0604020202020204" pitchFamily="34" charset="0"/>
+              </a:rPr>
+              <a:t>componenti</a:t>
+            </a:r>
+            <a:r>
+              <a:rPr kumimoji="0" lang="en-US" sz="1817" b="1" i="0" u="none" strike="noStrike" kern="1200" cap="none" spc="0" normalizeH="0" baseline="0" noProof="0" dirty="0">
+                <a:ln>
+                  <a:noFill/>
+                </a:ln>
+                <a:solidFill>
+                  <a:prstClr val="black">
+                    <a:lumMod val="75000"/>
+                    <a:lumOff val="25000"/>
+                  </a:prstClr>
+                </a:solidFill>
+                <a:effectLst/>
+                <a:uLnTx/>
+                <a:uFillTx/>
+                <a:latin typeface="Arial" panose="020B0604020202020204" pitchFamily="34" charset="0"/>
+                <a:ea typeface="+mn-ea"/>
+                <a:cs typeface="Arial" panose="020B0604020202020204" pitchFamily="34" charset="0"/>
+              </a:rPr>
+              <a:t>: </a:t>
+            </a:r>
+          </a:p>
+          <a:p>
+            <a:pPr marL="786860" marR="0" lvl="1" indent="-421930" algn="l" defTabSz="843858" rtl="0" eaLnBrk="1" fontAlgn="auto" latinLnBrk="0" hangingPunct="1">
+              <a:lnSpc>
+                <a:spcPct val="100000"/>
+              </a:lnSpc>
+              <a:spcBef>
+                <a:spcPts val="554"/>
+              </a:spcBef>
+              <a:spcAft>
+                <a:spcPts val="0"/>
+              </a:spcAft>
+              <a:buClr>
+                <a:prstClr val="black">
+                  <a:lumMod val="75000"/>
+                  <a:lumOff val="25000"/>
+                </a:prstClr>
+              </a:buClr>
+              <a:buSzPct val="75000"/>
+              <a:buFont typeface="Arial" panose="020B0604020202020204" pitchFamily="34" charset="0"/>
+              <a:buChar char="•"/>
+              <a:tabLst/>
+              <a:defRPr/>
+            </a:pPr>
+            <a:r>
+              <a:rPr kumimoji="0" lang="pt-BR" sz="1687" b="0" i="0" u="none" strike="noStrike" kern="1200" cap="none" spc="0" normalizeH="0" baseline="0" noProof="0" dirty="0">
+                <a:ln>
+                  <a:noFill/>
+                </a:ln>
+                <a:solidFill>
+                  <a:prstClr val="black">
+                    <a:lumMod val="75000"/>
+                    <a:lumOff val="25000"/>
+                  </a:prstClr>
+                </a:solidFill>
+                <a:effectLst/>
+                <a:uLnTx/>
+                <a:uFillTx/>
+                <a:latin typeface="Arial" panose="020B0604020202020204" pitchFamily="34" charset="0"/>
+                <a:ea typeface="+mn-ea"/>
+                <a:cs typeface="Arial" panose="020B0604020202020204" pitchFamily="34" charset="0"/>
+              </a:rPr>
+              <a:t>Componenti inutilizzate dell’IMU 10 DOF disabilitate per risparmio di consumo energetico:</a:t>
+            </a:r>
+          </a:p>
+          <a:p>
+            <a:pPr marL="1265788" lvl="2" indent="-421930" defTabSz="843858">
+              <a:spcBef>
+                <a:spcPts val="554"/>
+              </a:spcBef>
+              <a:buClr>
+                <a:prstClr val="black">
+                  <a:lumMod val="75000"/>
+                  <a:lumOff val="25000"/>
+                </a:prstClr>
+              </a:buClr>
+              <a:buSzPct val="75000"/>
+              <a:buFont typeface="Arial" panose="020B0604020202020204" pitchFamily="34" charset="0"/>
+              <a:buChar char="•"/>
+              <a:defRPr/>
+            </a:pPr>
+            <a:r>
+              <a:rPr lang="pt-BR" sz="1687" dirty="0">
+                <a:solidFill>
+                  <a:prstClr val="black">
+                    <a:lumMod val="75000"/>
+                    <a:lumOff val="25000"/>
+                  </a:prstClr>
+                </a:solidFill>
+                <a:latin typeface="Arial" panose="020B0604020202020204" pitchFamily="34" charset="0"/>
+                <a:cs typeface="Arial" panose="020B0604020202020204" pitchFamily="34" charset="0"/>
+              </a:rPr>
+              <a:t>Magnetometro</a:t>
+            </a:r>
+          </a:p>
+          <a:p>
+            <a:pPr marL="1265788" lvl="2" indent="-421930" defTabSz="843858">
+              <a:spcBef>
+                <a:spcPts val="554"/>
+              </a:spcBef>
+              <a:buClr>
+                <a:prstClr val="black">
+                  <a:lumMod val="75000"/>
+                  <a:lumOff val="25000"/>
+                </a:prstClr>
+              </a:buClr>
+              <a:buSzPct val="75000"/>
+              <a:buFont typeface="Arial" panose="020B0604020202020204" pitchFamily="34" charset="0"/>
+              <a:buChar char="•"/>
+              <a:defRPr/>
+            </a:pPr>
+            <a:r>
+              <a:rPr lang="pt-BR" sz="1687" dirty="0">
+                <a:solidFill>
+                  <a:prstClr val="black">
+                    <a:lumMod val="75000"/>
+                    <a:lumOff val="25000"/>
+                  </a:prstClr>
+                </a:solidFill>
+                <a:latin typeface="Arial" panose="020B0604020202020204" pitchFamily="34" charset="0"/>
+                <a:cs typeface="Arial" panose="020B0604020202020204" pitchFamily="34" charset="0"/>
+              </a:rPr>
+              <a:t>Giroscopio (assi X, Y e Z)</a:t>
+            </a:r>
+          </a:p>
+        </p:txBody>
+      </p:sp>
+      <p:pic>
+        <p:nvPicPr>
+          <p:cNvPr id="10" name="Immagine 9">
+            <a:extLst>
+              <a:ext uri="{FF2B5EF4-FFF2-40B4-BE49-F238E27FC236}">
+                <a16:creationId xmlns:a16="http://schemas.microsoft.com/office/drawing/2014/main" id="{4D6104C9-688B-54FB-1D0F-4B586FB287F3}"/>
+              </a:ext>
+            </a:extLst>
+          </p:cNvPr>
+          <p:cNvPicPr>
+            <a:picLocks noChangeAspect="1"/>
+          </p:cNvPicPr>
+          <p:nvPr/>
+        </p:nvPicPr>
+        <p:blipFill>
+          <a:blip r:embed="rId3"/>
+          <a:stretch>
+            <a:fillRect/>
+          </a:stretch>
+        </p:blipFill>
+        <p:spPr>
+          <a:xfrm>
+            <a:off x="958082" y="3872606"/>
+            <a:ext cx="2331872" cy="2331872"/>
+          </a:xfrm>
+          <a:prstGeom prst="rect">
+            <a:avLst/>
+          </a:prstGeom>
+        </p:spPr>
+      </p:pic>
+      <p:pic>
+        <p:nvPicPr>
+          <p:cNvPr id="14" name="Immagine 13" descr="Immagine che contiene testo, elettronico, circuito&#10;&#10;Descrizione generata automaticamente">
+            <a:extLst>
+              <a:ext uri="{FF2B5EF4-FFF2-40B4-BE49-F238E27FC236}">
+                <a16:creationId xmlns:a16="http://schemas.microsoft.com/office/drawing/2014/main" id="{F744D7ED-F529-0912-2ADF-468BE77219AC}"/>
+              </a:ext>
+            </a:extLst>
+          </p:cNvPr>
+          <p:cNvPicPr>
+            <a:picLocks noChangeAspect="1"/>
+          </p:cNvPicPr>
+          <p:nvPr/>
+        </p:nvPicPr>
+        <p:blipFill>
+          <a:blip r:embed="rId4"/>
+          <a:stretch>
+            <a:fillRect/>
+          </a:stretch>
+        </p:blipFill>
+        <p:spPr>
+          <a:xfrm>
+            <a:off x="599745" y="1377932"/>
+            <a:ext cx="3010631" cy="2066337"/>
+          </a:xfrm>
+          <a:prstGeom prst="rect">
+            <a:avLst/>
+          </a:prstGeom>
+        </p:spPr>
+      </p:pic>
+    </p:spTree>
+    <p:extLst>
+      <p:ext uri="{BB962C8B-B14F-4D97-AF65-F5344CB8AC3E}">
+        <p14:creationId xmlns:p14="http://schemas.microsoft.com/office/powerpoint/2010/main" val="1855326922"/>
+      </p:ext>
+    </p:extLst>
+  </p:cSld>
+  <p:clrMapOvr>
+    <a:masterClrMapping/>
+  </p:clrMapOvr>
+</p:sld>
+</file>
+
+<file path=ppt/slides/slide8.xml><?xml version="1.0" encoding="utf-8"?>
+<p:sld xmlns:a="http://schemas.openxmlformats.org/drawingml/2006/main" xmlns:r="http://schemas.openxmlformats.org/officeDocument/2006/relationships" xmlns:p="http://schemas.openxmlformats.org/presentationml/2006/main">
+  <p:cSld>
+    <p:spTree>
+      <p:nvGrpSpPr>
+        <p:cNvPr id="1" name=""/>
+        <p:cNvGrpSpPr/>
+        <p:nvPr/>
+      </p:nvGrpSpPr>
+      <p:grpSpPr>
+        <a:xfrm>
+          <a:off x="0" y="0"/>
+          <a:ext cx="0" cy="0"/>
+          <a:chOff x="0" y="0"/>
+          <a:chExt cx="0" cy="0"/>
+        </a:xfrm>
+      </p:grpSpPr>
+      <p:sp>
+        <p:nvSpPr>
+          <p:cNvPr id="2" name="Titolo 1">
+            <a:extLst>
+              <a:ext uri="{FF2B5EF4-FFF2-40B4-BE49-F238E27FC236}">
+                <a16:creationId xmlns:a16="http://schemas.microsoft.com/office/drawing/2014/main" id="{F46470BA-3007-184B-AF37-345D6F80A390}"/>
+              </a:ext>
+            </a:extLst>
+          </p:cNvPr>
+          <p:cNvSpPr>
+            <a:spLocks noGrp="1"/>
+          </p:cNvSpPr>
+          <p:nvPr>
+            <p:ph type="title"/>
+          </p:nvPr>
+        </p:nvSpPr>
+        <p:spPr/>
+        <p:txBody>
+          <a:bodyPr/>
+          <a:lstStyle/>
+          <a:p>
+            <a:r>
+              <a:rPr lang="en-US" dirty="0"/>
+              <a:t>Method: API Usage</a:t>
+            </a:r>
+          </a:p>
+        </p:txBody>
+      </p:sp>
+      <p:sp>
+        <p:nvSpPr>
+          <p:cNvPr id="4" name="Segnaposto numero diapositiva 3">
+            <a:extLst>
+              <a:ext uri="{FF2B5EF4-FFF2-40B4-BE49-F238E27FC236}">
+                <a16:creationId xmlns:a16="http://schemas.microsoft.com/office/drawing/2014/main" id="{50171237-E74B-F34B-A6AD-2ADA04AB097D}"/>
+              </a:ext>
+            </a:extLst>
+          </p:cNvPr>
+          <p:cNvSpPr>
+            <a:spLocks noGrp="1"/>
+          </p:cNvSpPr>
+          <p:nvPr>
+            <p:ph type="sldNum" sz="quarter" idx="12"/>
+          </p:nvPr>
+        </p:nvSpPr>
+        <p:spPr/>
+        <p:txBody>
+          <a:bodyPr/>
+          <a:lstStyle/>
+          <a:p>
+            <a:fld id="{389832E7-CD1C-8649-98ED-2ABDE863B9F8}" type="slidenum">
+              <a:rPr lang="it-IT" smtClean="0"/>
+              <a:pPr/>
+              <a:t>8</a:t>
             </a:fld>
             <a:endParaRPr lang="it-IT" dirty="0" err="1"/>
           </a:p>
@@ -13593,7 +15023,7 @@
 </p:sld>
 </file>
 
-<file path=ppt/slides/slide8.xml><?xml version="1.0" encoding="utf-8"?>
+<file path=ppt/slides/slide9.xml><?xml version="1.0" encoding="utf-8"?>
 <p:sld xmlns:a="http://schemas.openxmlformats.org/drawingml/2006/main" xmlns:r="http://schemas.openxmlformats.org/officeDocument/2006/relationships" xmlns:p="http://schemas.openxmlformats.org/presentationml/2006/main">
   <p:cSld>
     <p:spTree>
@@ -13662,7 +15092,7 @@
             <a:fld id="{389832E7-CD1C-8649-98ED-2ABDE863B9F8}" type="slidenum">
               <a:rPr lang="it-IT" smtClean="0"/>
               <a:pPr/>
-              <a:t>8</a:t>
+              <a:t>9</a:t>
             </a:fld>
             <a:endParaRPr lang="it-IT" dirty="0" err="1"/>
           </a:p>
@@ -14001,566 +15431,6 @@
     <p:extLst>
       <p:ext uri="{BB962C8B-B14F-4D97-AF65-F5344CB8AC3E}">
         <p14:creationId xmlns:p14="http://schemas.microsoft.com/office/powerpoint/2010/main" val="91562988"/>
-      </p:ext>
-    </p:extLst>
-  </p:cSld>
-  <p:clrMapOvr>
-    <a:masterClrMapping/>
-  </p:clrMapOvr>
-</p:sld>
-</file>
-
-<file path=ppt/slides/slide9.xml><?xml version="1.0" encoding="utf-8"?>
-<p:sld xmlns:a="http://schemas.openxmlformats.org/drawingml/2006/main" xmlns:r="http://schemas.openxmlformats.org/officeDocument/2006/relationships" xmlns:p="http://schemas.openxmlformats.org/presentationml/2006/main">
-  <p:cSld>
-    <p:spTree>
-      <p:nvGrpSpPr>
-        <p:cNvPr id="1" name=""/>
-        <p:cNvGrpSpPr/>
-        <p:nvPr/>
-      </p:nvGrpSpPr>
-      <p:grpSpPr>
-        <a:xfrm>
-          <a:off x="0" y="0"/>
-          <a:ext cx="0" cy="0"/>
-          <a:chOff x="0" y="0"/>
-          <a:chExt cx="0" cy="0"/>
-        </a:xfrm>
-      </p:grpSpPr>
-      <p:sp>
-        <p:nvSpPr>
-          <p:cNvPr id="2" name="Titolo 1">
-            <a:extLst>
-              <a:ext uri="{FF2B5EF4-FFF2-40B4-BE49-F238E27FC236}">
-                <a16:creationId xmlns:a16="http://schemas.microsoft.com/office/drawing/2014/main" id="{F46470BA-3007-184B-AF37-345D6F80A390}"/>
-              </a:ext>
-            </a:extLst>
-          </p:cNvPr>
-          <p:cNvSpPr>
-            <a:spLocks noGrp="1"/>
-          </p:cNvSpPr>
-          <p:nvPr>
-            <p:ph type="title"/>
-          </p:nvPr>
-        </p:nvSpPr>
-        <p:spPr/>
-        <p:txBody>
-          <a:bodyPr/>
-          <a:lstStyle/>
-          <a:p>
-            <a:r>
-              <a:rPr lang="en-US" dirty="0"/>
-              <a:t>Method: Telegram Bot</a:t>
-            </a:r>
-          </a:p>
-        </p:txBody>
-      </p:sp>
-      <p:sp>
-        <p:nvSpPr>
-          <p:cNvPr id="4" name="Segnaposto numero diapositiva 3">
-            <a:extLst>
-              <a:ext uri="{FF2B5EF4-FFF2-40B4-BE49-F238E27FC236}">
-                <a16:creationId xmlns:a16="http://schemas.microsoft.com/office/drawing/2014/main" id="{50171237-E74B-F34B-A6AD-2ADA04AB097D}"/>
-              </a:ext>
-            </a:extLst>
-          </p:cNvPr>
-          <p:cNvSpPr>
-            <a:spLocks noGrp="1"/>
-          </p:cNvSpPr>
-          <p:nvPr>
-            <p:ph type="sldNum" sz="quarter" idx="12"/>
-          </p:nvPr>
-        </p:nvSpPr>
-        <p:spPr/>
-        <p:txBody>
-          <a:bodyPr/>
-          <a:lstStyle/>
-          <a:p>
-            <a:fld id="{389832E7-CD1C-8649-98ED-2ABDE863B9F8}" type="slidenum">
-              <a:rPr lang="it-IT" smtClean="0"/>
-              <a:pPr/>
-              <a:t>9</a:t>
-            </a:fld>
-            <a:endParaRPr lang="it-IT" dirty="0" err="1"/>
-          </a:p>
-        </p:txBody>
-      </p:sp>
-      <p:sp>
-        <p:nvSpPr>
-          <p:cNvPr id="5" name="Segnaposto contenuto 4">
-            <a:extLst>
-              <a:ext uri="{FF2B5EF4-FFF2-40B4-BE49-F238E27FC236}">
-                <a16:creationId xmlns:a16="http://schemas.microsoft.com/office/drawing/2014/main" id="{5790AEF5-1816-BB41-AD38-B2380590B075}"/>
-              </a:ext>
-            </a:extLst>
-          </p:cNvPr>
-          <p:cNvSpPr>
-            <a:spLocks noGrp="1"/>
-          </p:cNvSpPr>
-          <p:nvPr>
-            <p:ph sz="quarter" idx="13"/>
-          </p:nvPr>
-        </p:nvSpPr>
-        <p:spPr/>
-        <p:txBody>
-          <a:bodyPr/>
-          <a:lstStyle/>
-          <a:p>
-            <a:r>
-              <a:rPr lang="en-US" dirty="0"/>
-              <a:t>Description system: choices, parameters, use cases</a:t>
-            </a:r>
-          </a:p>
-        </p:txBody>
-      </p:sp>
-      <p:sp>
-        <p:nvSpPr>
-          <p:cNvPr id="6" name="Segnaposto piè di pagina 5">
-            <a:extLst>
-              <a:ext uri="{FF2B5EF4-FFF2-40B4-BE49-F238E27FC236}">
-                <a16:creationId xmlns:a16="http://schemas.microsoft.com/office/drawing/2014/main" id="{3276E258-63A7-EF47-A9E2-09FA8F14BCCA}"/>
-              </a:ext>
-            </a:extLst>
-          </p:cNvPr>
-          <p:cNvSpPr>
-            <a:spLocks noGrp="1"/>
-          </p:cNvSpPr>
-          <p:nvPr>
-            <p:ph type="ftr" sz="quarter" idx="11"/>
-          </p:nvPr>
-        </p:nvSpPr>
-        <p:spPr/>
-        <p:txBody>
-          <a:bodyPr/>
-          <a:lstStyle/>
-          <a:p>
-            <a:r>
-              <a:rPr lang="it-IT" dirty="0"/>
-              <a:t>Team </a:t>
-            </a:r>
-            <a:r>
-              <a:rPr lang="it-IT" dirty="0" err="1"/>
-              <a:t>overlap</a:t>
-            </a:r>
-            <a:r>
-              <a:rPr lang="it-IT" dirty="0"/>
-              <a:t> - Laboratorio </a:t>
-            </a:r>
-            <a:r>
-              <a:rPr lang="it-IT" dirty="0" err="1"/>
-              <a:t>IoT@UniMiB</a:t>
-            </a:r>
-            <a:endParaRPr lang="it-IT" dirty="0"/>
-          </a:p>
-        </p:txBody>
-      </p:sp>
-      <p:sp>
-        <p:nvSpPr>
-          <p:cNvPr id="11" name="CasellaDiTesto 10">
-            <a:extLst>
-              <a:ext uri="{FF2B5EF4-FFF2-40B4-BE49-F238E27FC236}">
-                <a16:creationId xmlns:a16="http://schemas.microsoft.com/office/drawing/2014/main" id="{A83BA598-7D83-4D28-BA75-D0FF273D37BF}"/>
-              </a:ext>
-            </a:extLst>
-          </p:cNvPr>
-          <p:cNvSpPr txBox="1"/>
-          <p:nvPr/>
-        </p:nvSpPr>
-        <p:spPr>
-          <a:xfrm>
-            <a:off x="-1" y="1377074"/>
-            <a:ext cx="5171222" cy="3449855"/>
-          </a:xfrm>
-          <a:prstGeom prst="rect">
-            <a:avLst/>
-          </a:prstGeom>
-          <a:noFill/>
-        </p:spPr>
-        <p:txBody>
-          <a:bodyPr wrap="square" rtlCol="0">
-            <a:spAutoFit/>
-          </a:bodyPr>
-          <a:lstStyle/>
-          <a:p>
-            <a:pPr marL="421928" marR="0" lvl="1" algn="l" defTabSz="843858" rtl="0" eaLnBrk="1" fontAlgn="auto" latinLnBrk="0" hangingPunct="1">
-              <a:lnSpc>
-                <a:spcPct val="100000"/>
-              </a:lnSpc>
-              <a:spcBef>
-                <a:spcPts val="554"/>
-              </a:spcBef>
-              <a:spcAft>
-                <a:spcPts val="0"/>
-              </a:spcAft>
-              <a:buClr>
-                <a:prstClr val="black">
-                  <a:lumMod val="50000"/>
-                  <a:lumOff val="50000"/>
-                </a:prstClr>
-              </a:buClr>
-              <a:buSzPct val="75000"/>
-              <a:tabLst/>
-              <a:defRPr/>
-            </a:pPr>
-            <a:r>
-              <a:rPr kumimoji="0" lang="en-US" sz="1817" b="1" i="0" u="none" strike="noStrike" kern="1200" cap="none" spc="0" normalizeH="0" baseline="0" noProof="0" dirty="0" err="1">
-                <a:ln>
-                  <a:noFill/>
-                </a:ln>
-                <a:solidFill>
-                  <a:prstClr val="black">
-                    <a:lumMod val="75000"/>
-                    <a:lumOff val="25000"/>
-                  </a:prstClr>
-                </a:solidFill>
-                <a:effectLst/>
-                <a:uLnTx/>
-                <a:uFillTx/>
-                <a:latin typeface="Arial" panose="020B0604020202020204" pitchFamily="34" charset="0"/>
-                <a:ea typeface="+mn-ea"/>
-                <a:cs typeface="Arial" panose="020B0604020202020204" pitchFamily="34" charset="0"/>
-              </a:rPr>
-              <a:t>Specifiche</a:t>
-            </a:r>
-            <a:r>
-              <a:rPr kumimoji="0" lang="en-US" sz="1817" b="1" i="0" u="none" strike="noStrike" kern="1200" cap="none" spc="0" normalizeH="0" baseline="0" noProof="0" dirty="0">
-                <a:ln>
-                  <a:noFill/>
-                </a:ln>
-                <a:solidFill>
-                  <a:prstClr val="black">
-                    <a:lumMod val="75000"/>
-                    <a:lumOff val="25000"/>
-                  </a:prstClr>
-                </a:solidFill>
-                <a:effectLst/>
-                <a:uLnTx/>
-                <a:uFillTx/>
-                <a:latin typeface="Arial" panose="020B0604020202020204" pitchFamily="34" charset="0"/>
-                <a:ea typeface="+mn-ea"/>
-                <a:cs typeface="Arial" panose="020B0604020202020204" pitchFamily="34" charset="0"/>
-              </a:rPr>
-              <a:t> di </a:t>
-            </a:r>
-            <a:r>
-              <a:rPr lang="en-US" sz="1817" b="1" dirty="0">
-                <a:solidFill>
-                  <a:prstClr val="black">
-                    <a:lumMod val="75000"/>
-                    <a:lumOff val="25000"/>
-                  </a:prstClr>
-                </a:solidFill>
-                <a:latin typeface="Arial" panose="020B0604020202020204" pitchFamily="34" charset="0"/>
-                <a:cs typeface="Arial" panose="020B0604020202020204" pitchFamily="34" charset="0"/>
-              </a:rPr>
-              <a:t>I</a:t>
-            </a:r>
-            <a:r>
-              <a:rPr kumimoji="0" lang="en-US" sz="1817" b="1" i="0" u="none" strike="noStrike" kern="1200" cap="none" spc="0" normalizeH="0" baseline="0" noProof="0" dirty="0" err="1">
-                <a:ln>
-                  <a:noFill/>
-                </a:ln>
-                <a:solidFill>
-                  <a:prstClr val="black">
-                    <a:lumMod val="75000"/>
-                    <a:lumOff val="25000"/>
-                  </a:prstClr>
-                </a:solidFill>
-                <a:effectLst/>
-                <a:uLnTx/>
-                <a:uFillTx/>
-                <a:latin typeface="Arial" panose="020B0604020202020204" pitchFamily="34" charset="0"/>
-                <a:ea typeface="+mn-ea"/>
-                <a:cs typeface="Arial" panose="020B0604020202020204" pitchFamily="34" charset="0"/>
-              </a:rPr>
-              <a:t>mplementazione</a:t>
-            </a:r>
-            <a:r>
-              <a:rPr kumimoji="0" lang="en-US" sz="1817" b="1" i="0" u="none" strike="noStrike" kern="1200" cap="none" spc="0" normalizeH="0" baseline="0" noProof="0" dirty="0">
-                <a:ln>
-                  <a:noFill/>
-                </a:ln>
-                <a:solidFill>
-                  <a:prstClr val="black">
-                    <a:lumMod val="75000"/>
-                    <a:lumOff val="25000"/>
-                  </a:prstClr>
-                </a:solidFill>
-                <a:effectLst/>
-                <a:uLnTx/>
-                <a:uFillTx/>
-                <a:latin typeface="Arial" panose="020B0604020202020204" pitchFamily="34" charset="0"/>
-                <a:ea typeface="+mn-ea"/>
-                <a:cs typeface="Arial" panose="020B0604020202020204" pitchFamily="34" charset="0"/>
-              </a:rPr>
-              <a:t>: </a:t>
-            </a:r>
-          </a:p>
-          <a:p>
-            <a:pPr marL="421928" marR="0" lvl="1" algn="l" defTabSz="843858" rtl="0" eaLnBrk="1" fontAlgn="auto" latinLnBrk="0" hangingPunct="1">
-              <a:lnSpc>
-                <a:spcPct val="100000"/>
-              </a:lnSpc>
-              <a:spcBef>
-                <a:spcPts val="554"/>
-              </a:spcBef>
-              <a:spcAft>
-                <a:spcPts val="0"/>
-              </a:spcAft>
-              <a:buClr>
-                <a:prstClr val="black">
-                  <a:lumMod val="50000"/>
-                  <a:lumOff val="50000"/>
-                </a:prstClr>
-              </a:buClr>
-              <a:buSzPct val="75000"/>
-              <a:tabLst/>
-              <a:defRPr/>
-            </a:pPr>
-            <a:endParaRPr kumimoji="0" lang="en-US" sz="1817" b="1" i="0" u="none" strike="noStrike" kern="1200" cap="none" spc="0" normalizeH="0" baseline="0" noProof="0" dirty="0">
-              <a:ln>
-                <a:noFill/>
-              </a:ln>
-              <a:solidFill>
-                <a:prstClr val="black">
-                  <a:lumMod val="75000"/>
-                  <a:lumOff val="25000"/>
-                </a:prstClr>
-              </a:solidFill>
-              <a:effectLst/>
-              <a:uLnTx/>
-              <a:uFillTx/>
-              <a:latin typeface="Arial" panose="020B0604020202020204" pitchFamily="34" charset="0"/>
-              <a:ea typeface="+mn-ea"/>
-              <a:cs typeface="Arial" panose="020B0604020202020204" pitchFamily="34" charset="0"/>
-            </a:endParaRPr>
-          </a:p>
-          <a:p>
-            <a:pPr marL="786860" lvl="1" indent="-421930" defTabSz="843858">
-              <a:spcBef>
-                <a:spcPts val="554"/>
-              </a:spcBef>
-              <a:buClr>
-                <a:prstClr val="black">
-                  <a:lumMod val="75000"/>
-                  <a:lumOff val="25000"/>
-                </a:prstClr>
-              </a:buClr>
-              <a:buSzPct val="75000"/>
-              <a:buFont typeface="Arial" panose="020B0604020202020204" pitchFamily="34" charset="0"/>
-              <a:buChar char="•"/>
-              <a:defRPr/>
-            </a:pPr>
-            <a:r>
-              <a:rPr lang="pt-BR" sz="1687" dirty="0">
-                <a:solidFill>
-                  <a:prstClr val="black">
-                    <a:lumMod val="75000"/>
-                    <a:lumOff val="25000"/>
-                  </a:prstClr>
-                </a:solidFill>
-                <a:latin typeface="Arial" panose="020B0604020202020204" pitchFamily="34" charset="0"/>
-                <a:cs typeface="Arial" panose="020B0604020202020204" pitchFamily="34" charset="0"/>
-              </a:rPr>
-              <a:t>I terremoti segnalati agli utenti sono sia quelli rilevati dal sismografo che ricevuti dalle API</a:t>
-            </a:r>
-          </a:p>
-          <a:p>
-            <a:pPr marL="364930" lvl="1" defTabSz="843858">
-              <a:spcBef>
-                <a:spcPts val="554"/>
-              </a:spcBef>
-              <a:buClr>
-                <a:prstClr val="black">
-                  <a:lumMod val="75000"/>
-                  <a:lumOff val="25000"/>
-                </a:prstClr>
-              </a:buClr>
-              <a:buSzPct val="75000"/>
-              <a:defRPr/>
-            </a:pPr>
-            <a:endParaRPr lang="pt-BR" sz="1687" dirty="0">
-              <a:solidFill>
-                <a:prstClr val="black">
-                  <a:lumMod val="75000"/>
-                  <a:lumOff val="25000"/>
-                </a:prstClr>
-              </a:solidFill>
-              <a:latin typeface="Arial" panose="020B0604020202020204" pitchFamily="34" charset="0"/>
-              <a:cs typeface="Arial" panose="020B0604020202020204" pitchFamily="34" charset="0"/>
-            </a:endParaRPr>
-          </a:p>
-          <a:p>
-            <a:pPr marL="786860" lvl="1" indent="-421930" defTabSz="843858">
-              <a:spcBef>
-                <a:spcPts val="554"/>
-              </a:spcBef>
-              <a:buClr>
-                <a:prstClr val="black">
-                  <a:lumMod val="75000"/>
-                  <a:lumOff val="25000"/>
-                </a:prstClr>
-              </a:buClr>
-              <a:buSzPct val="75000"/>
-              <a:buFont typeface="Arial" panose="020B0604020202020204" pitchFamily="34" charset="0"/>
-              <a:buChar char="•"/>
-              <a:defRPr/>
-            </a:pPr>
-            <a:r>
-              <a:rPr lang="pt-BR" sz="1687" dirty="0">
-                <a:solidFill>
-                  <a:prstClr val="black">
-                    <a:lumMod val="75000"/>
-                    <a:lumOff val="25000"/>
-                  </a:prstClr>
-                </a:solidFill>
-                <a:latin typeface="Arial" panose="020B0604020202020204" pitchFamily="34" charset="0"/>
-                <a:cs typeface="Arial" panose="020B0604020202020204" pitchFamily="34" charset="0"/>
-              </a:rPr>
-              <a:t>Libreria utilizzata: </a:t>
-            </a:r>
-            <a:r>
-              <a:rPr lang="pt-BR" sz="1687" i="1" dirty="0">
-                <a:solidFill>
-                  <a:prstClr val="black">
-                    <a:lumMod val="75000"/>
-                    <a:lumOff val="25000"/>
-                  </a:prstClr>
-                </a:solidFill>
-                <a:latin typeface="Arial" panose="020B0604020202020204" pitchFamily="34" charset="0"/>
-                <a:cs typeface="Arial" panose="020B0604020202020204" pitchFamily="34" charset="0"/>
-              </a:rPr>
-              <a:t>python-telegram-bot </a:t>
-            </a:r>
-            <a:r>
-              <a:rPr lang="pt-BR" sz="1687" dirty="0">
-                <a:solidFill>
-                  <a:prstClr val="black">
-                    <a:lumMod val="75000"/>
-                    <a:lumOff val="25000"/>
-                  </a:prstClr>
-                </a:solidFill>
-                <a:latin typeface="Arial" panose="020B0604020202020204" pitchFamily="34" charset="0"/>
-                <a:cs typeface="Arial" panose="020B0604020202020204" pitchFamily="34" charset="0"/>
-              </a:rPr>
-              <a:t>(asincrona)</a:t>
-            </a:r>
-          </a:p>
-          <a:p>
-            <a:pPr marL="786860" lvl="1" indent="-421930" defTabSz="843858">
-              <a:spcBef>
-                <a:spcPts val="554"/>
-              </a:spcBef>
-              <a:buClr>
-                <a:prstClr val="black">
-                  <a:lumMod val="75000"/>
-                  <a:lumOff val="25000"/>
-                </a:prstClr>
-              </a:buClr>
-              <a:buSzPct val="75000"/>
-              <a:buFont typeface="Arial" panose="020B0604020202020204" pitchFamily="34" charset="0"/>
-              <a:buChar char="•"/>
-              <a:defRPr/>
-            </a:pPr>
-            <a:r>
-              <a:rPr lang="pt-BR" sz="1687" dirty="0">
-                <a:solidFill>
-                  <a:prstClr val="black">
-                    <a:lumMod val="75000"/>
-                    <a:lumOff val="25000"/>
-                  </a:prstClr>
-                </a:solidFill>
-                <a:latin typeface="Arial" panose="020B0604020202020204" pitchFamily="34" charset="0"/>
-                <a:cs typeface="Arial" panose="020B0604020202020204" pitchFamily="34" charset="0"/>
-              </a:rPr>
-              <a:t>L’intero master-node è stato riprogettato per poter girare attorno ad </a:t>
-            </a:r>
-            <a:r>
-              <a:rPr lang="pt-BR" sz="1687" i="1" dirty="0">
-                <a:solidFill>
-                  <a:prstClr val="black">
-                    <a:lumMod val="75000"/>
-                    <a:lumOff val="25000"/>
-                  </a:prstClr>
-                </a:solidFill>
-                <a:latin typeface="Arial" panose="020B0604020202020204" pitchFamily="34" charset="0"/>
-                <a:cs typeface="Arial" panose="020B0604020202020204" pitchFamily="34" charset="0"/>
-              </a:rPr>
-              <a:t>asyncio</a:t>
-            </a:r>
-            <a:endParaRPr lang="pt-BR" sz="1687" dirty="0">
-              <a:solidFill>
-                <a:prstClr val="black">
-                  <a:lumMod val="75000"/>
-                  <a:lumOff val="25000"/>
-                </a:prstClr>
-              </a:solidFill>
-              <a:latin typeface="Arial" panose="020B0604020202020204" pitchFamily="34" charset="0"/>
-              <a:cs typeface="Arial" panose="020B0604020202020204" pitchFamily="34" charset="0"/>
-            </a:endParaRPr>
-          </a:p>
-          <a:p>
-            <a:pPr marL="786860" lvl="1" indent="-421930" defTabSz="843858">
-              <a:spcBef>
-                <a:spcPts val="554"/>
-              </a:spcBef>
-              <a:buClr>
-                <a:prstClr val="black">
-                  <a:lumMod val="75000"/>
-                  <a:lumOff val="25000"/>
-                </a:prstClr>
-              </a:buClr>
-              <a:buSzPct val="75000"/>
-              <a:buFont typeface="Arial" panose="020B0604020202020204" pitchFamily="34" charset="0"/>
-              <a:buChar char="•"/>
-              <a:defRPr/>
-            </a:pPr>
-            <a:endParaRPr lang="pt-BR" sz="1687" dirty="0">
-              <a:solidFill>
-                <a:prstClr val="black">
-                  <a:lumMod val="75000"/>
-                  <a:lumOff val="25000"/>
-                </a:prstClr>
-              </a:solidFill>
-              <a:latin typeface="Arial" panose="020B0604020202020204" pitchFamily="34" charset="0"/>
-              <a:cs typeface="Arial" panose="020B0604020202020204" pitchFamily="34" charset="0"/>
-            </a:endParaRPr>
-          </a:p>
-        </p:txBody>
-      </p:sp>
-      <p:pic>
-        <p:nvPicPr>
-          <p:cNvPr id="12" name="Immagine 11">
-            <a:extLst>
-              <a:ext uri="{FF2B5EF4-FFF2-40B4-BE49-F238E27FC236}">
-                <a16:creationId xmlns:a16="http://schemas.microsoft.com/office/drawing/2014/main" id="{5520794F-A8E6-A15E-C7D2-FCD2E4F979BB}"/>
-              </a:ext>
-            </a:extLst>
-          </p:cNvPr>
-          <p:cNvPicPr>
-            <a:picLocks noChangeAspect="1"/>
-          </p:cNvPicPr>
-          <p:nvPr/>
-        </p:nvPicPr>
-        <p:blipFill>
-          <a:blip r:embed="rId2"/>
-          <a:srcRect/>
-          <a:stretch/>
-        </p:blipFill>
-        <p:spPr>
-          <a:xfrm>
-            <a:off x="5838082" y="1065501"/>
-            <a:ext cx="2708407" cy="5256316"/>
-          </a:xfrm>
-          <a:prstGeom prst="rect">
-            <a:avLst/>
-          </a:prstGeom>
-        </p:spPr>
-      </p:pic>
-    </p:spTree>
-    <p:extLst>
-      <p:ext uri="{BB962C8B-B14F-4D97-AF65-F5344CB8AC3E}">
-        <p14:creationId xmlns:p14="http://schemas.microsoft.com/office/powerpoint/2010/main" val="1380741558"/>
       </p:ext>
     </p:extLst>
   </p:cSld>

</xml_diff>